<commit_message>
Starting to introduce images
</commit_message>
<xml_diff>
--- a/Proposal/Images/quadratic_surfaces_bags.pptx
+++ b/Proposal/Images/quadratic_surfaces_bags.pptx
@@ -6,6 +6,9 @@
   </p:sldMasterIdLst>
   <p:sldIdLst>
     <p:sldId id="256" r:id="rId2"/>
+    <p:sldId id="257" r:id="rId3"/>
+    <p:sldId id="258" r:id="rId4"/>
+    <p:sldId id="259" r:id="rId5"/>
   </p:sldIdLst>
   <p:sldSz cx="12192000" cy="6858000"/>
   <p:notesSz cx="6858000" cy="9144000"/>
@@ -104,6 +107,11 @@
       </a:defRPr>
     </a:lvl9pPr>
   </p:defaultTextStyle>
+  <p:extLst>
+    <p:ext uri="{EFAFB233-063F-42B5-8137-9DF3F51BA10A}">
+      <p15:sldGuideLst xmlns:p15="http://schemas.microsoft.com/office/powerpoint/2012/main"/>
+    </p:ext>
+  </p:extLst>
 </p:presentation>
 </file>
 
@@ -254,7 +262,7 @@
           <a:p>
             <a:fld id="{B5686CB4-F599-40B6-B93D-CDA65E645F4F}" type="datetimeFigureOut">
               <a:rPr lang="en-US" smtClean="0"/>
-              <a:t>2/15/2020</a:t>
+              <a:t>5/3/2020</a:t>
             </a:fld>
             <a:endParaRPr lang="en-US"/>
           </a:p>
@@ -452,7 +460,7 @@
           <a:p>
             <a:fld id="{B5686CB4-F599-40B6-B93D-CDA65E645F4F}" type="datetimeFigureOut">
               <a:rPr lang="en-US" smtClean="0"/>
-              <a:t>2/15/2020</a:t>
+              <a:t>5/3/2020</a:t>
             </a:fld>
             <a:endParaRPr lang="en-US"/>
           </a:p>
@@ -660,7 +668,7 @@
           <a:p>
             <a:fld id="{B5686CB4-F599-40B6-B93D-CDA65E645F4F}" type="datetimeFigureOut">
               <a:rPr lang="en-US" smtClean="0"/>
-              <a:t>2/15/2020</a:t>
+              <a:t>5/3/2020</a:t>
             </a:fld>
             <a:endParaRPr lang="en-US"/>
           </a:p>
@@ -858,7 +866,7 @@
           <a:p>
             <a:fld id="{B5686CB4-F599-40B6-B93D-CDA65E645F4F}" type="datetimeFigureOut">
               <a:rPr lang="en-US" smtClean="0"/>
-              <a:t>2/15/2020</a:t>
+              <a:t>5/3/2020</a:t>
             </a:fld>
             <a:endParaRPr lang="en-US"/>
           </a:p>
@@ -1133,7 +1141,7 @@
           <a:p>
             <a:fld id="{B5686CB4-F599-40B6-B93D-CDA65E645F4F}" type="datetimeFigureOut">
               <a:rPr lang="en-US" smtClean="0"/>
-              <a:t>2/15/2020</a:t>
+              <a:t>5/3/2020</a:t>
             </a:fld>
             <a:endParaRPr lang="en-US"/>
           </a:p>
@@ -1398,7 +1406,7 @@
           <a:p>
             <a:fld id="{B5686CB4-F599-40B6-B93D-CDA65E645F4F}" type="datetimeFigureOut">
               <a:rPr lang="en-US" smtClean="0"/>
-              <a:t>2/15/2020</a:t>
+              <a:t>5/3/2020</a:t>
             </a:fld>
             <a:endParaRPr lang="en-US"/>
           </a:p>
@@ -1810,7 +1818,7 @@
           <a:p>
             <a:fld id="{B5686CB4-F599-40B6-B93D-CDA65E645F4F}" type="datetimeFigureOut">
               <a:rPr lang="en-US" smtClean="0"/>
-              <a:t>2/15/2020</a:t>
+              <a:t>5/3/2020</a:t>
             </a:fld>
             <a:endParaRPr lang="en-US"/>
           </a:p>
@@ -1951,7 +1959,7 @@
           <a:p>
             <a:fld id="{B5686CB4-F599-40B6-B93D-CDA65E645F4F}" type="datetimeFigureOut">
               <a:rPr lang="en-US" smtClean="0"/>
-              <a:t>2/15/2020</a:t>
+              <a:t>5/3/2020</a:t>
             </a:fld>
             <a:endParaRPr lang="en-US"/>
           </a:p>
@@ -2064,7 +2072,7 @@
           <a:p>
             <a:fld id="{B5686CB4-F599-40B6-B93D-CDA65E645F4F}" type="datetimeFigureOut">
               <a:rPr lang="en-US" smtClean="0"/>
-              <a:t>2/15/2020</a:t>
+              <a:t>5/3/2020</a:t>
             </a:fld>
             <a:endParaRPr lang="en-US"/>
           </a:p>
@@ -2375,7 +2383,7 @@
           <a:p>
             <a:fld id="{B5686CB4-F599-40B6-B93D-CDA65E645F4F}" type="datetimeFigureOut">
               <a:rPr lang="en-US" smtClean="0"/>
-              <a:t>2/15/2020</a:t>
+              <a:t>5/3/2020</a:t>
             </a:fld>
             <a:endParaRPr lang="en-US"/>
           </a:p>
@@ -2663,7 +2671,7 @@
           <a:p>
             <a:fld id="{B5686CB4-F599-40B6-B93D-CDA65E645F4F}" type="datetimeFigureOut">
               <a:rPr lang="en-US" smtClean="0"/>
-              <a:t>2/15/2020</a:t>
+              <a:t>5/3/2020</a:t>
             </a:fld>
             <a:endParaRPr lang="en-US"/>
           </a:p>
@@ -2904,7 +2912,7 @@
           <a:p>
             <a:fld id="{B5686CB4-F599-40B6-B93D-CDA65E645F4F}" type="datetimeFigureOut">
               <a:rPr lang="en-US" smtClean="0"/>
-              <a:t>2/15/2020</a:t>
+              <a:t>5/3/2020</a:t>
             </a:fld>
             <a:endParaRPr lang="en-US"/>
           </a:p>
@@ -3856,6 +3864,1996 @@
 </p:sld>
 </file>
 
+<file path=ppt/slides/slide2.xml><?xml version="1.0" encoding="utf-8"?>
+<p:sld xmlns:a="http://schemas.openxmlformats.org/drawingml/2006/main" xmlns:r="http://schemas.openxmlformats.org/officeDocument/2006/relationships" xmlns:p="http://schemas.openxmlformats.org/presentationml/2006/main">
+  <p:cSld>
+    <p:spTree>
+      <p:nvGrpSpPr>
+        <p:cNvPr id="1" name=""/>
+        <p:cNvGrpSpPr/>
+        <p:nvPr/>
+      </p:nvGrpSpPr>
+      <p:grpSpPr>
+        <a:xfrm>
+          <a:off x="0" y="0"/>
+          <a:ext cx="0" cy="0"/>
+          <a:chOff x="0" y="0"/>
+          <a:chExt cx="0" cy="0"/>
+        </a:xfrm>
+      </p:grpSpPr>
+      <p:grpSp>
+        <p:nvGrpSpPr>
+          <p:cNvPr id="7" name="Group 6">
+            <a:extLst>
+              <a:ext uri="{FF2B5EF4-FFF2-40B4-BE49-F238E27FC236}">
+                <a16:creationId xmlns:a16="http://schemas.microsoft.com/office/drawing/2014/main" id="{28CECBF9-A6A3-4228-BC35-489219E8E286}"/>
+              </a:ext>
+            </a:extLst>
+          </p:cNvPr>
+          <p:cNvGrpSpPr/>
+          <p:nvPr/>
+        </p:nvGrpSpPr>
+        <p:grpSpPr>
+          <a:xfrm>
+            <a:off x="2667000" y="1000125"/>
+            <a:ext cx="6858000" cy="4857750"/>
+            <a:chOff x="2667000" y="1000125"/>
+            <a:chExt cx="6858000" cy="4857750"/>
+          </a:xfrm>
+        </p:grpSpPr>
+        <p:pic>
+          <p:nvPicPr>
+            <p:cNvPr id="3" name="Picture 2" descr="A picture containing outdoor, grass, track, water&#10;&#10;Description automatically generated">
+              <a:extLst>
+                <a:ext uri="{FF2B5EF4-FFF2-40B4-BE49-F238E27FC236}">
+                  <a16:creationId xmlns:a16="http://schemas.microsoft.com/office/drawing/2014/main" id="{1FFFCB98-A850-4CFF-8640-3C05BF8C6448}"/>
+                </a:ext>
+              </a:extLst>
+            </p:cNvPr>
+            <p:cNvPicPr>
+              <a:picLocks noChangeAspect="1"/>
+            </p:cNvPicPr>
+            <p:nvPr/>
+          </p:nvPicPr>
+          <p:blipFill>
+            <a:blip r:embed="rId2">
+              <a:extLst>
+                <a:ext uri="{28A0092B-C50C-407E-A947-70E740481C1C}">
+                  <a14:useLocalDpi xmlns:a14="http://schemas.microsoft.com/office/drawing/2010/main" val="0"/>
+                </a:ext>
+              </a:extLst>
+            </a:blip>
+            <a:stretch>
+              <a:fillRect/>
+            </a:stretch>
+          </p:blipFill>
+          <p:spPr>
+            <a:xfrm>
+              <a:off x="2667000" y="1000125"/>
+              <a:ext cx="6858000" cy="4857750"/>
+            </a:xfrm>
+            <a:prstGeom prst="rect">
+              <a:avLst/>
+            </a:prstGeom>
+          </p:spPr>
+        </p:pic>
+        <p:sp>
+          <p:nvSpPr>
+            <p:cNvPr id="6" name="TextBox 5">
+              <a:extLst>
+                <a:ext uri="{FF2B5EF4-FFF2-40B4-BE49-F238E27FC236}">
+                  <a16:creationId xmlns:a16="http://schemas.microsoft.com/office/drawing/2014/main" id="{9E4FC295-5DE3-4BB3-9C19-38813DE52D05}"/>
+                </a:ext>
+              </a:extLst>
+            </p:cNvPr>
+            <p:cNvSpPr txBox="1"/>
+            <p:nvPr/>
+          </p:nvSpPr>
+          <p:spPr>
+            <a:xfrm>
+              <a:off x="7190913" y="1411549"/>
+              <a:ext cx="1944209" cy="646331"/>
+            </a:xfrm>
+            <a:prstGeom prst="rect">
+              <a:avLst/>
+            </a:prstGeom>
+            <a:noFill/>
+            <a:ln w="57150">
+              <a:solidFill>
+                <a:srgbClr val="FF0000"/>
+              </a:solidFill>
+            </a:ln>
+          </p:spPr>
+          <p:txBody>
+            <a:bodyPr wrap="square" rtlCol="0">
+              <a:spAutoFit/>
+            </a:bodyPr>
+            <a:lstStyle/>
+            <a:p>
+              <a:pPr algn="ctr"/>
+              <a:r>
+                <a:rPr lang="en-US" sz="3600" b="1" dirty="0"/>
+                <a:t>Target</a:t>
+              </a:r>
+            </a:p>
+          </p:txBody>
+        </p:sp>
+      </p:grpSp>
+    </p:spTree>
+    <p:extLst>
+      <p:ext uri="{BB962C8B-B14F-4D97-AF65-F5344CB8AC3E}">
+        <p14:creationId xmlns:p14="http://schemas.microsoft.com/office/powerpoint/2010/main" val="2370310131"/>
+      </p:ext>
+    </p:extLst>
+  </p:cSld>
+  <p:clrMapOvr>
+    <a:masterClrMapping/>
+  </p:clrMapOvr>
+</p:sld>
+</file>
+
+<file path=ppt/slides/slide3.xml><?xml version="1.0" encoding="utf-8"?>
+<p:sld xmlns:a="http://schemas.openxmlformats.org/drawingml/2006/main" xmlns:r="http://schemas.openxmlformats.org/officeDocument/2006/relationships" xmlns:p="http://schemas.openxmlformats.org/presentationml/2006/main">
+  <p:cSld>
+    <p:spTree>
+      <p:nvGrpSpPr>
+        <p:cNvPr id="1" name=""/>
+        <p:cNvGrpSpPr/>
+        <p:nvPr/>
+      </p:nvGrpSpPr>
+      <p:grpSpPr>
+        <a:xfrm>
+          <a:off x="0" y="0"/>
+          <a:ext cx="0" cy="0"/>
+          <a:chOff x="0" y="0"/>
+          <a:chExt cx="0" cy="0"/>
+        </a:xfrm>
+      </p:grpSpPr>
+      <p:grpSp>
+        <p:nvGrpSpPr>
+          <p:cNvPr id="4" name="Group 3">
+            <a:extLst>
+              <a:ext uri="{FF2B5EF4-FFF2-40B4-BE49-F238E27FC236}">
+                <a16:creationId xmlns:a16="http://schemas.microsoft.com/office/drawing/2014/main" id="{CFCB5C0B-4CA0-4A4C-864B-E657C2F83293}"/>
+              </a:ext>
+            </a:extLst>
+          </p:cNvPr>
+          <p:cNvGrpSpPr/>
+          <p:nvPr/>
+        </p:nvGrpSpPr>
+        <p:grpSpPr>
+          <a:xfrm>
+            <a:off x="2667000" y="1080024"/>
+            <a:ext cx="6858000" cy="4857750"/>
+            <a:chOff x="2667000" y="1080024"/>
+            <a:chExt cx="6858000" cy="4857750"/>
+          </a:xfrm>
+        </p:grpSpPr>
+        <p:pic>
+          <p:nvPicPr>
+            <p:cNvPr id="2" name="Picture 1" descr="A close up of some grass&#10;&#10;Description automatically generated">
+              <a:extLst>
+                <a:ext uri="{FF2B5EF4-FFF2-40B4-BE49-F238E27FC236}">
+                  <a16:creationId xmlns:a16="http://schemas.microsoft.com/office/drawing/2014/main" id="{A0663E77-77F7-4CA4-AB5C-71952A72497C}"/>
+                </a:ext>
+              </a:extLst>
+            </p:cNvPr>
+            <p:cNvPicPr>
+              <a:picLocks noChangeAspect="1"/>
+            </p:cNvPicPr>
+            <p:nvPr/>
+          </p:nvPicPr>
+          <p:blipFill>
+            <a:blip r:embed="rId2">
+              <a:extLst>
+                <a:ext uri="{28A0092B-C50C-407E-A947-70E740481C1C}">
+                  <a14:useLocalDpi xmlns:a14="http://schemas.microsoft.com/office/drawing/2010/main" val="0"/>
+                </a:ext>
+              </a:extLst>
+            </a:blip>
+            <a:stretch>
+              <a:fillRect/>
+            </a:stretch>
+          </p:blipFill>
+          <p:spPr>
+            <a:xfrm>
+              <a:off x="2667000" y="1080024"/>
+              <a:ext cx="6858000" cy="4857750"/>
+            </a:xfrm>
+            <a:prstGeom prst="rect">
+              <a:avLst/>
+            </a:prstGeom>
+          </p:spPr>
+        </p:pic>
+        <p:sp>
+          <p:nvSpPr>
+            <p:cNvPr id="3" name="TextBox 2">
+              <a:extLst>
+                <a:ext uri="{FF2B5EF4-FFF2-40B4-BE49-F238E27FC236}">
+                  <a16:creationId xmlns:a16="http://schemas.microsoft.com/office/drawing/2014/main" id="{30B86E4E-AADE-4AB1-A503-C93D725B5400}"/>
+                </a:ext>
+              </a:extLst>
+            </p:cNvPr>
+            <p:cNvSpPr txBox="1"/>
+            <p:nvPr/>
+          </p:nvSpPr>
+          <p:spPr>
+            <a:xfrm>
+              <a:off x="6587231" y="1411549"/>
+              <a:ext cx="2547891" cy="646331"/>
+            </a:xfrm>
+            <a:prstGeom prst="rect">
+              <a:avLst/>
+            </a:prstGeom>
+            <a:noFill/>
+            <a:ln w="57150">
+              <a:solidFill>
+                <a:srgbClr val="FF0000"/>
+              </a:solidFill>
+            </a:ln>
+          </p:spPr>
+          <p:txBody>
+            <a:bodyPr wrap="square" rtlCol="0">
+              <a:spAutoFit/>
+            </a:bodyPr>
+            <a:lstStyle/>
+            <a:p>
+              <a:pPr algn="ctr"/>
+              <a:r>
+                <a:rPr lang="en-US" sz="3600" b="1" dirty="0"/>
+                <a:t>Background</a:t>
+              </a:r>
+            </a:p>
+          </p:txBody>
+        </p:sp>
+      </p:grpSp>
+    </p:spTree>
+    <p:extLst>
+      <p:ext uri="{BB962C8B-B14F-4D97-AF65-F5344CB8AC3E}">
+        <p14:creationId xmlns:p14="http://schemas.microsoft.com/office/powerpoint/2010/main" val="1691065401"/>
+      </p:ext>
+    </p:extLst>
+  </p:cSld>
+  <p:clrMapOvr>
+    <a:masterClrMapping/>
+  </p:clrMapOvr>
+</p:sld>
+</file>
+
+<file path=ppt/slides/slide4.xml><?xml version="1.0" encoding="utf-8"?>
+<p:sld xmlns:a="http://schemas.openxmlformats.org/drawingml/2006/main" xmlns:r="http://schemas.openxmlformats.org/officeDocument/2006/relationships" xmlns:p="http://schemas.openxmlformats.org/presentationml/2006/main">
+  <p:cSld>
+    <p:spTree>
+      <p:nvGrpSpPr>
+        <p:cNvPr id="1" name=""/>
+        <p:cNvGrpSpPr/>
+        <p:nvPr/>
+      </p:nvGrpSpPr>
+      <p:grpSpPr>
+        <a:xfrm>
+          <a:off x="0" y="0"/>
+          <a:ext cx="0" cy="0"/>
+          <a:chOff x="0" y="0"/>
+          <a:chExt cx="0" cy="0"/>
+        </a:xfrm>
+      </p:grpSpPr>
+      <p:sp>
+        <p:nvSpPr>
+          <p:cNvPr id="8" name="TextBox 7">
+            <a:extLst>
+              <a:ext uri="{FF2B5EF4-FFF2-40B4-BE49-F238E27FC236}">
+                <a16:creationId xmlns:a16="http://schemas.microsoft.com/office/drawing/2014/main" id="{A8D5FF13-A8F4-47FB-8D97-D88796E48B19}"/>
+              </a:ext>
+            </a:extLst>
+          </p:cNvPr>
+          <p:cNvSpPr txBox="1"/>
+          <p:nvPr/>
+        </p:nvSpPr>
+        <p:spPr>
+          <a:xfrm>
+            <a:off x="10696852" y="5661418"/>
+            <a:ext cx="531181" cy="830997"/>
+          </a:xfrm>
+          <a:prstGeom prst="rect">
+            <a:avLst/>
+          </a:prstGeom>
+          <a:noFill/>
+        </p:spPr>
+        <p:txBody>
+          <a:bodyPr wrap="square" rtlCol="0">
+            <a:spAutoFit/>
+          </a:bodyPr>
+          <a:lstStyle/>
+          <a:p>
+            <a:pPr algn="ctr"/>
+            <a:r>
+              <a:rPr lang="en-US" sz="4800" b="1" dirty="0">
+                <a:solidFill>
+                  <a:srgbClr val="0070C0"/>
+                </a:solidFill>
+              </a:rPr>
+              <a:t>-</a:t>
+            </a:r>
+          </a:p>
+        </p:txBody>
+      </p:sp>
+      <p:grpSp>
+        <p:nvGrpSpPr>
+          <p:cNvPr id="44" name="Group 43">
+            <a:extLst>
+              <a:ext uri="{FF2B5EF4-FFF2-40B4-BE49-F238E27FC236}">
+                <a16:creationId xmlns:a16="http://schemas.microsoft.com/office/drawing/2014/main" id="{52F3C845-0EE2-4A2B-8621-E0FCEEE6E9EC}"/>
+              </a:ext>
+            </a:extLst>
+          </p:cNvPr>
+          <p:cNvGrpSpPr/>
+          <p:nvPr/>
+        </p:nvGrpSpPr>
+        <p:grpSpPr>
+          <a:xfrm>
+            <a:off x="4480264" y="1649532"/>
+            <a:ext cx="1397670" cy="1384095"/>
+            <a:chOff x="4480264" y="1649532"/>
+            <a:chExt cx="1397670" cy="1384095"/>
+          </a:xfrm>
+        </p:grpSpPr>
+        <p:sp>
+          <p:nvSpPr>
+            <p:cNvPr id="9" name="Oval 8">
+              <a:extLst>
+                <a:ext uri="{FF2B5EF4-FFF2-40B4-BE49-F238E27FC236}">
+                  <a16:creationId xmlns:a16="http://schemas.microsoft.com/office/drawing/2014/main" id="{98177F7F-1CFA-49D8-960A-B3080E02F66B}"/>
+                </a:ext>
+              </a:extLst>
+            </p:cNvPr>
+            <p:cNvSpPr/>
+            <p:nvPr/>
+          </p:nvSpPr>
+          <p:spPr>
+            <a:xfrm>
+              <a:off x="4480264" y="1684222"/>
+              <a:ext cx="1376039" cy="1349405"/>
+            </a:xfrm>
+            <a:prstGeom prst="ellipse">
+              <a:avLst/>
+            </a:prstGeom>
+            <a:ln w="57150"/>
+          </p:spPr>
+          <p:style>
+            <a:lnRef idx="1">
+              <a:schemeClr val="accent3"/>
+            </a:lnRef>
+            <a:fillRef idx="2">
+              <a:schemeClr val="accent3"/>
+            </a:fillRef>
+            <a:effectRef idx="1">
+              <a:schemeClr val="accent3"/>
+            </a:effectRef>
+            <a:fontRef idx="minor">
+              <a:schemeClr val="dk1"/>
+            </a:fontRef>
+          </p:style>
+          <p:txBody>
+            <a:bodyPr rtlCol="0" anchor="ctr"/>
+            <a:lstStyle/>
+            <a:p>
+              <a:pPr algn="ctr"/>
+              <a:endParaRPr lang="en-US"/>
+            </a:p>
+          </p:txBody>
+        </p:sp>
+        <p:sp>
+          <p:nvSpPr>
+            <p:cNvPr id="18" name="TextBox 17">
+              <a:extLst>
+                <a:ext uri="{FF2B5EF4-FFF2-40B4-BE49-F238E27FC236}">
+                  <a16:creationId xmlns:a16="http://schemas.microsoft.com/office/drawing/2014/main" id="{75B8DE2E-2BEA-4481-9E3E-38B041D94E71}"/>
+                </a:ext>
+              </a:extLst>
+            </p:cNvPr>
+            <p:cNvSpPr txBox="1"/>
+            <p:nvPr/>
+          </p:nvSpPr>
+          <p:spPr>
+            <a:xfrm>
+              <a:off x="4559792" y="1649532"/>
+              <a:ext cx="531181" cy="830997"/>
+            </a:xfrm>
+            <a:prstGeom prst="rect">
+              <a:avLst/>
+            </a:prstGeom>
+            <a:noFill/>
+          </p:spPr>
+          <p:txBody>
+            <a:bodyPr wrap="square" rtlCol="0">
+              <a:spAutoFit/>
+            </a:bodyPr>
+            <a:lstStyle/>
+            <a:p>
+              <a:pPr algn="ctr"/>
+              <a:r>
+                <a:rPr lang="en-US" sz="4800" b="1" dirty="0">
+                  <a:solidFill>
+                    <a:srgbClr val="0070C0"/>
+                  </a:solidFill>
+                </a:rPr>
+                <a:t>-</a:t>
+              </a:r>
+            </a:p>
+          </p:txBody>
+        </p:sp>
+        <p:sp>
+          <p:nvSpPr>
+            <p:cNvPr id="19" name="TextBox 18">
+              <a:extLst>
+                <a:ext uri="{FF2B5EF4-FFF2-40B4-BE49-F238E27FC236}">
+                  <a16:creationId xmlns:a16="http://schemas.microsoft.com/office/drawing/2014/main" id="{381CD562-15C2-4F55-A678-8F6E659569B6}"/>
+                </a:ext>
+              </a:extLst>
+            </p:cNvPr>
+            <p:cNvSpPr txBox="1"/>
+            <p:nvPr/>
+          </p:nvSpPr>
+          <p:spPr>
+            <a:xfrm>
+              <a:off x="4647918" y="2199827"/>
+              <a:ext cx="531181" cy="830997"/>
+            </a:xfrm>
+            <a:prstGeom prst="rect">
+              <a:avLst/>
+            </a:prstGeom>
+            <a:noFill/>
+          </p:spPr>
+          <p:txBody>
+            <a:bodyPr wrap="square" rtlCol="0">
+              <a:spAutoFit/>
+            </a:bodyPr>
+            <a:lstStyle/>
+            <a:p>
+              <a:pPr algn="ctr"/>
+              <a:r>
+                <a:rPr lang="en-US" sz="4800" b="1" dirty="0">
+                  <a:solidFill>
+                    <a:srgbClr val="0070C0"/>
+                  </a:solidFill>
+                </a:rPr>
+                <a:t>-</a:t>
+              </a:r>
+            </a:p>
+          </p:txBody>
+        </p:sp>
+        <p:sp>
+          <p:nvSpPr>
+            <p:cNvPr id="20" name="TextBox 19">
+              <a:extLst>
+                <a:ext uri="{FF2B5EF4-FFF2-40B4-BE49-F238E27FC236}">
+                  <a16:creationId xmlns:a16="http://schemas.microsoft.com/office/drawing/2014/main" id="{88BB0E5F-9D07-4131-B1DB-0C390363C683}"/>
+                </a:ext>
+              </a:extLst>
+            </p:cNvPr>
+            <p:cNvSpPr txBox="1"/>
+            <p:nvPr/>
+          </p:nvSpPr>
+          <p:spPr>
+            <a:xfrm>
+              <a:off x="5346753" y="2063044"/>
+              <a:ext cx="531181" cy="830997"/>
+            </a:xfrm>
+            <a:prstGeom prst="rect">
+              <a:avLst/>
+            </a:prstGeom>
+            <a:noFill/>
+          </p:spPr>
+          <p:txBody>
+            <a:bodyPr wrap="square" rtlCol="0">
+              <a:spAutoFit/>
+            </a:bodyPr>
+            <a:lstStyle/>
+            <a:p>
+              <a:pPr algn="ctr"/>
+              <a:r>
+                <a:rPr lang="en-US" sz="4800" b="1" dirty="0">
+                  <a:solidFill>
+                    <a:srgbClr val="0070C0"/>
+                  </a:solidFill>
+                </a:rPr>
+                <a:t>-</a:t>
+              </a:r>
+            </a:p>
+          </p:txBody>
+        </p:sp>
+        <p:sp>
+          <p:nvSpPr>
+            <p:cNvPr id="21" name="TextBox 20">
+              <a:extLst>
+                <a:ext uri="{FF2B5EF4-FFF2-40B4-BE49-F238E27FC236}">
+                  <a16:creationId xmlns:a16="http://schemas.microsoft.com/office/drawing/2014/main" id="{748272D7-78EE-4C8B-9F01-239E75D4266D}"/>
+                </a:ext>
+              </a:extLst>
+            </p:cNvPr>
+            <p:cNvSpPr txBox="1"/>
+            <p:nvPr/>
+          </p:nvSpPr>
+          <p:spPr>
+            <a:xfrm>
+              <a:off x="4865375" y="1925132"/>
+              <a:ext cx="531181" cy="830997"/>
+            </a:xfrm>
+            <a:prstGeom prst="rect">
+              <a:avLst/>
+            </a:prstGeom>
+            <a:noFill/>
+          </p:spPr>
+          <p:txBody>
+            <a:bodyPr wrap="square" rtlCol="0">
+              <a:spAutoFit/>
+            </a:bodyPr>
+            <a:lstStyle/>
+            <a:p>
+              <a:pPr algn="ctr"/>
+              <a:r>
+                <a:rPr lang="en-US" sz="4800" b="1" dirty="0">
+                  <a:solidFill>
+                    <a:srgbClr val="0070C0"/>
+                  </a:solidFill>
+                </a:rPr>
+                <a:t>-</a:t>
+              </a:r>
+            </a:p>
+          </p:txBody>
+        </p:sp>
+      </p:grpSp>
+      <p:grpSp>
+        <p:nvGrpSpPr>
+          <p:cNvPr id="43" name="Group 42">
+            <a:extLst>
+              <a:ext uri="{FF2B5EF4-FFF2-40B4-BE49-F238E27FC236}">
+                <a16:creationId xmlns:a16="http://schemas.microsoft.com/office/drawing/2014/main" id="{399CD95D-3F49-4E7A-9BAA-B7E019DB1695}"/>
+              </a:ext>
+            </a:extLst>
+          </p:cNvPr>
+          <p:cNvGrpSpPr/>
+          <p:nvPr/>
+        </p:nvGrpSpPr>
+        <p:grpSpPr>
+          <a:xfrm>
+            <a:off x="2540493" y="1547357"/>
+            <a:ext cx="1376039" cy="1453295"/>
+            <a:chOff x="2540493" y="1547357"/>
+            <a:chExt cx="1376039" cy="1453295"/>
+          </a:xfrm>
+        </p:grpSpPr>
+        <p:sp>
+          <p:nvSpPr>
+            <p:cNvPr id="2" name="Oval 1">
+              <a:extLst>
+                <a:ext uri="{FF2B5EF4-FFF2-40B4-BE49-F238E27FC236}">
+                  <a16:creationId xmlns:a16="http://schemas.microsoft.com/office/drawing/2014/main" id="{19C6F433-2494-4EE4-8AE8-E02B4EAB0CDA}"/>
+                </a:ext>
+              </a:extLst>
+            </p:cNvPr>
+            <p:cNvSpPr/>
+            <p:nvPr/>
+          </p:nvSpPr>
+          <p:spPr>
+            <a:xfrm>
+              <a:off x="2540493" y="1651247"/>
+              <a:ext cx="1376039" cy="1349405"/>
+            </a:xfrm>
+            <a:prstGeom prst="ellipse">
+              <a:avLst/>
+            </a:prstGeom>
+            <a:ln w="57150"/>
+          </p:spPr>
+          <p:style>
+            <a:lnRef idx="1">
+              <a:schemeClr val="accent3"/>
+            </a:lnRef>
+            <a:fillRef idx="2">
+              <a:schemeClr val="accent3"/>
+            </a:fillRef>
+            <a:effectRef idx="1">
+              <a:schemeClr val="accent3"/>
+            </a:effectRef>
+            <a:fontRef idx="minor">
+              <a:schemeClr val="dk1"/>
+            </a:fontRef>
+          </p:style>
+          <p:txBody>
+            <a:bodyPr rtlCol="0" anchor="ctr"/>
+            <a:lstStyle/>
+            <a:p>
+              <a:pPr algn="ctr"/>
+              <a:endParaRPr lang="en-US"/>
+            </a:p>
+          </p:txBody>
+        </p:sp>
+        <p:sp>
+          <p:nvSpPr>
+            <p:cNvPr id="13" name="TextBox 12">
+              <a:extLst>
+                <a:ext uri="{FF2B5EF4-FFF2-40B4-BE49-F238E27FC236}">
+                  <a16:creationId xmlns:a16="http://schemas.microsoft.com/office/drawing/2014/main" id="{B14F128C-727A-4AFF-9CD4-C36B4EBE5950}"/>
+                </a:ext>
+              </a:extLst>
+            </p:cNvPr>
+            <p:cNvSpPr txBox="1"/>
+            <p:nvPr/>
+          </p:nvSpPr>
+          <p:spPr>
+            <a:xfrm>
+              <a:off x="2580811" y="1770083"/>
+              <a:ext cx="531181" cy="830997"/>
+            </a:xfrm>
+            <a:prstGeom prst="rect">
+              <a:avLst/>
+            </a:prstGeom>
+            <a:noFill/>
+          </p:spPr>
+          <p:txBody>
+            <a:bodyPr wrap="square" rtlCol="0">
+              <a:spAutoFit/>
+            </a:bodyPr>
+            <a:lstStyle/>
+            <a:p>
+              <a:pPr algn="ctr"/>
+              <a:r>
+                <a:rPr lang="en-US" sz="4800" b="1" dirty="0">
+                  <a:solidFill>
+                    <a:srgbClr val="0070C0"/>
+                  </a:solidFill>
+                </a:rPr>
+                <a:t>-</a:t>
+              </a:r>
+            </a:p>
+          </p:txBody>
+        </p:sp>
+        <p:sp>
+          <p:nvSpPr>
+            <p:cNvPr id="14" name="TextBox 13">
+              <a:extLst>
+                <a:ext uri="{FF2B5EF4-FFF2-40B4-BE49-F238E27FC236}">
+                  <a16:creationId xmlns:a16="http://schemas.microsoft.com/office/drawing/2014/main" id="{B5ECC1CB-C202-406F-99AF-A3AC01902A7C}"/>
+                </a:ext>
+              </a:extLst>
+            </p:cNvPr>
+            <p:cNvSpPr txBox="1"/>
+            <p:nvPr/>
+          </p:nvSpPr>
+          <p:spPr>
+            <a:xfrm>
+              <a:off x="2862676" y="2101681"/>
+              <a:ext cx="531181" cy="830997"/>
+            </a:xfrm>
+            <a:prstGeom prst="rect">
+              <a:avLst/>
+            </a:prstGeom>
+            <a:noFill/>
+          </p:spPr>
+          <p:txBody>
+            <a:bodyPr wrap="square" rtlCol="0">
+              <a:spAutoFit/>
+            </a:bodyPr>
+            <a:lstStyle/>
+            <a:p>
+              <a:pPr algn="ctr"/>
+              <a:r>
+                <a:rPr lang="en-US" sz="4800" b="1" dirty="0">
+                  <a:solidFill>
+                    <a:srgbClr val="0070C0"/>
+                  </a:solidFill>
+                </a:rPr>
+                <a:t>-</a:t>
+              </a:r>
+            </a:p>
+          </p:txBody>
+        </p:sp>
+        <p:sp>
+          <p:nvSpPr>
+            <p:cNvPr id="15" name="TextBox 14">
+              <a:extLst>
+                <a:ext uri="{FF2B5EF4-FFF2-40B4-BE49-F238E27FC236}">
+                  <a16:creationId xmlns:a16="http://schemas.microsoft.com/office/drawing/2014/main" id="{998C0394-E906-4429-815C-9AFF7C2CE290}"/>
+                </a:ext>
+              </a:extLst>
+            </p:cNvPr>
+            <p:cNvSpPr txBox="1"/>
+            <p:nvPr/>
+          </p:nvSpPr>
+          <p:spPr>
+            <a:xfrm>
+              <a:off x="3116060" y="1547357"/>
+              <a:ext cx="531181" cy="830997"/>
+            </a:xfrm>
+            <a:prstGeom prst="rect">
+              <a:avLst/>
+            </a:prstGeom>
+            <a:noFill/>
+          </p:spPr>
+          <p:txBody>
+            <a:bodyPr wrap="square" rtlCol="0">
+              <a:spAutoFit/>
+            </a:bodyPr>
+            <a:lstStyle/>
+            <a:p>
+              <a:pPr algn="ctr"/>
+              <a:r>
+                <a:rPr lang="en-US" sz="4800" b="1" dirty="0">
+                  <a:solidFill>
+                    <a:srgbClr val="0070C0"/>
+                  </a:solidFill>
+                </a:rPr>
+                <a:t>-</a:t>
+              </a:r>
+            </a:p>
+          </p:txBody>
+        </p:sp>
+        <p:sp>
+          <p:nvSpPr>
+            <p:cNvPr id="16" name="TextBox 15">
+              <a:extLst>
+                <a:ext uri="{FF2B5EF4-FFF2-40B4-BE49-F238E27FC236}">
+                  <a16:creationId xmlns:a16="http://schemas.microsoft.com/office/drawing/2014/main" id="{0993228A-CA05-4CFA-A3D1-B144689F0A18}"/>
+                </a:ext>
+              </a:extLst>
+            </p:cNvPr>
+            <p:cNvSpPr txBox="1"/>
+            <p:nvPr/>
+          </p:nvSpPr>
+          <p:spPr>
+            <a:xfrm>
+              <a:off x="3381098" y="1996843"/>
+              <a:ext cx="531181" cy="830997"/>
+            </a:xfrm>
+            <a:prstGeom prst="rect">
+              <a:avLst/>
+            </a:prstGeom>
+            <a:noFill/>
+          </p:spPr>
+          <p:txBody>
+            <a:bodyPr wrap="square" rtlCol="0">
+              <a:spAutoFit/>
+            </a:bodyPr>
+            <a:lstStyle/>
+            <a:p>
+              <a:pPr algn="ctr"/>
+              <a:r>
+                <a:rPr lang="en-US" sz="4800" b="1" dirty="0">
+                  <a:solidFill>
+                    <a:srgbClr val="0070C0"/>
+                  </a:solidFill>
+                </a:rPr>
+                <a:t>-</a:t>
+              </a:r>
+            </a:p>
+          </p:txBody>
+        </p:sp>
+        <p:sp>
+          <p:nvSpPr>
+            <p:cNvPr id="23" name="TextBox 22">
+              <a:extLst>
+                <a:ext uri="{FF2B5EF4-FFF2-40B4-BE49-F238E27FC236}">
+                  <a16:creationId xmlns:a16="http://schemas.microsoft.com/office/drawing/2014/main" id="{77B9C52B-5B79-469F-862F-D27A11E73903}"/>
+                </a:ext>
+              </a:extLst>
+            </p:cNvPr>
+            <p:cNvSpPr txBox="1"/>
+            <p:nvPr/>
+          </p:nvSpPr>
+          <p:spPr>
+            <a:xfrm>
+              <a:off x="2733211" y="1922483"/>
+              <a:ext cx="531181" cy="830997"/>
+            </a:xfrm>
+            <a:prstGeom prst="rect">
+              <a:avLst/>
+            </a:prstGeom>
+            <a:noFill/>
+          </p:spPr>
+          <p:txBody>
+            <a:bodyPr wrap="square" rtlCol="0">
+              <a:spAutoFit/>
+            </a:bodyPr>
+            <a:lstStyle/>
+            <a:p>
+              <a:pPr algn="ctr"/>
+              <a:r>
+                <a:rPr lang="en-US" sz="4800" b="1" dirty="0">
+                  <a:solidFill>
+                    <a:srgbClr val="0070C0"/>
+                  </a:solidFill>
+                </a:rPr>
+                <a:t>-</a:t>
+              </a:r>
+            </a:p>
+          </p:txBody>
+        </p:sp>
+      </p:grpSp>
+      <p:grpSp>
+        <p:nvGrpSpPr>
+          <p:cNvPr id="45" name="Group 44">
+            <a:extLst>
+              <a:ext uri="{FF2B5EF4-FFF2-40B4-BE49-F238E27FC236}">
+                <a16:creationId xmlns:a16="http://schemas.microsoft.com/office/drawing/2014/main" id="{F80F1ADA-0BEB-4D15-BDDE-6F1F5B2D9FF7}"/>
+              </a:ext>
+            </a:extLst>
+          </p:cNvPr>
+          <p:cNvGrpSpPr/>
+          <p:nvPr/>
+        </p:nvGrpSpPr>
+        <p:grpSpPr>
+          <a:xfrm>
+            <a:off x="5270376" y="3353104"/>
+            <a:ext cx="1376039" cy="1536222"/>
+            <a:chOff x="5270376" y="3353104"/>
+            <a:chExt cx="1376039" cy="1536222"/>
+          </a:xfrm>
+        </p:grpSpPr>
+        <p:sp>
+          <p:nvSpPr>
+            <p:cNvPr id="12" name="Oval 11">
+              <a:extLst>
+                <a:ext uri="{FF2B5EF4-FFF2-40B4-BE49-F238E27FC236}">
+                  <a16:creationId xmlns:a16="http://schemas.microsoft.com/office/drawing/2014/main" id="{8A663827-0EF3-4B4C-B0E0-C3BA4D8CAD7D}"/>
+                </a:ext>
+              </a:extLst>
+            </p:cNvPr>
+            <p:cNvSpPr/>
+            <p:nvPr/>
+          </p:nvSpPr>
+          <p:spPr>
+            <a:xfrm>
+              <a:off x="5270376" y="3429000"/>
+              <a:ext cx="1376039" cy="1349405"/>
+            </a:xfrm>
+            <a:prstGeom prst="ellipse">
+              <a:avLst/>
+            </a:prstGeom>
+            <a:ln w="57150"/>
+          </p:spPr>
+          <p:style>
+            <a:lnRef idx="1">
+              <a:schemeClr val="accent3"/>
+            </a:lnRef>
+            <a:fillRef idx="2">
+              <a:schemeClr val="accent3"/>
+            </a:fillRef>
+            <a:effectRef idx="1">
+              <a:schemeClr val="accent3"/>
+            </a:effectRef>
+            <a:fontRef idx="minor">
+              <a:schemeClr val="dk1"/>
+            </a:fontRef>
+          </p:style>
+          <p:txBody>
+            <a:bodyPr rtlCol="0" anchor="ctr"/>
+            <a:lstStyle/>
+            <a:p>
+              <a:pPr algn="ctr"/>
+              <a:endParaRPr lang="en-US"/>
+            </a:p>
+          </p:txBody>
+        </p:sp>
+        <p:sp>
+          <p:nvSpPr>
+            <p:cNvPr id="26" name="TextBox 25">
+              <a:extLst>
+                <a:ext uri="{FF2B5EF4-FFF2-40B4-BE49-F238E27FC236}">
+                  <a16:creationId xmlns:a16="http://schemas.microsoft.com/office/drawing/2014/main" id="{4F550456-4BD8-451C-8165-40AE654646D8}"/>
+                </a:ext>
+              </a:extLst>
+            </p:cNvPr>
+            <p:cNvSpPr txBox="1"/>
+            <p:nvPr/>
+          </p:nvSpPr>
+          <p:spPr>
+            <a:xfrm>
+              <a:off x="5877934" y="3842472"/>
+              <a:ext cx="531181" cy="830997"/>
+            </a:xfrm>
+            <a:prstGeom prst="rect">
+              <a:avLst/>
+            </a:prstGeom>
+            <a:noFill/>
+          </p:spPr>
+          <p:txBody>
+            <a:bodyPr wrap="square" rtlCol="0">
+              <a:spAutoFit/>
+            </a:bodyPr>
+            <a:lstStyle/>
+            <a:p>
+              <a:pPr algn="ctr"/>
+              <a:r>
+                <a:rPr lang="en-US" sz="4800" b="1" dirty="0">
+                  <a:solidFill>
+                    <a:srgbClr val="0070C0"/>
+                  </a:solidFill>
+                </a:rPr>
+                <a:t>-</a:t>
+              </a:r>
+            </a:p>
+          </p:txBody>
+        </p:sp>
+        <p:sp>
+          <p:nvSpPr>
+            <p:cNvPr id="7" name="TextBox 6">
+              <a:extLst>
+                <a:ext uri="{FF2B5EF4-FFF2-40B4-BE49-F238E27FC236}">
+                  <a16:creationId xmlns:a16="http://schemas.microsoft.com/office/drawing/2014/main" id="{12E8C849-16B0-497B-B4F5-745E96424DE4}"/>
+                </a:ext>
+              </a:extLst>
+            </p:cNvPr>
+            <p:cNvSpPr txBox="1"/>
+            <p:nvPr/>
+          </p:nvSpPr>
+          <p:spPr>
+            <a:xfrm>
+              <a:off x="5464444" y="3353104"/>
+              <a:ext cx="531181" cy="707886"/>
+            </a:xfrm>
+            <a:prstGeom prst="rect">
+              <a:avLst/>
+            </a:prstGeom>
+            <a:noFill/>
+          </p:spPr>
+          <p:txBody>
+            <a:bodyPr wrap="square" rtlCol="0">
+              <a:spAutoFit/>
+            </a:bodyPr>
+            <a:lstStyle/>
+            <a:p>
+              <a:pPr algn="ctr"/>
+              <a:r>
+                <a:rPr lang="en-US" sz="4000" b="1" dirty="0">
+                  <a:solidFill>
+                    <a:srgbClr val="FF0000"/>
+                  </a:solidFill>
+                </a:rPr>
+                <a:t>+</a:t>
+              </a:r>
+            </a:p>
+          </p:txBody>
+        </p:sp>
+        <p:sp>
+          <p:nvSpPr>
+            <p:cNvPr id="33" name="TextBox 32">
+              <a:extLst>
+                <a:ext uri="{FF2B5EF4-FFF2-40B4-BE49-F238E27FC236}">
+                  <a16:creationId xmlns:a16="http://schemas.microsoft.com/office/drawing/2014/main" id="{BDCFED7F-BE59-462E-8E31-E25EA48A9EE5}"/>
+                </a:ext>
+              </a:extLst>
+            </p:cNvPr>
+            <p:cNvSpPr txBox="1"/>
+            <p:nvPr/>
+          </p:nvSpPr>
+          <p:spPr>
+            <a:xfrm>
+              <a:off x="6055429" y="3604679"/>
+              <a:ext cx="531181" cy="707886"/>
+            </a:xfrm>
+            <a:prstGeom prst="rect">
+              <a:avLst/>
+            </a:prstGeom>
+            <a:noFill/>
+          </p:spPr>
+          <p:txBody>
+            <a:bodyPr wrap="square" rtlCol="0">
+              <a:spAutoFit/>
+            </a:bodyPr>
+            <a:lstStyle/>
+            <a:p>
+              <a:pPr algn="ctr"/>
+              <a:r>
+                <a:rPr lang="en-US" sz="4000" b="1" dirty="0">
+                  <a:solidFill>
+                    <a:srgbClr val="FF0000"/>
+                  </a:solidFill>
+                </a:rPr>
+                <a:t>+</a:t>
+              </a:r>
+            </a:p>
+          </p:txBody>
+        </p:sp>
+        <p:sp>
+          <p:nvSpPr>
+            <p:cNvPr id="34" name="TextBox 33">
+              <a:extLst>
+                <a:ext uri="{FF2B5EF4-FFF2-40B4-BE49-F238E27FC236}">
+                  <a16:creationId xmlns:a16="http://schemas.microsoft.com/office/drawing/2014/main" id="{481D95D0-CA0E-4645-BC68-007C57F7903F}"/>
+                </a:ext>
+              </a:extLst>
+            </p:cNvPr>
+            <p:cNvSpPr txBox="1"/>
+            <p:nvPr/>
+          </p:nvSpPr>
+          <p:spPr>
+            <a:xfrm>
+              <a:off x="5316851" y="3842390"/>
+              <a:ext cx="531181" cy="707886"/>
+            </a:xfrm>
+            <a:prstGeom prst="rect">
+              <a:avLst/>
+            </a:prstGeom>
+            <a:noFill/>
+          </p:spPr>
+          <p:txBody>
+            <a:bodyPr wrap="square" rtlCol="0">
+              <a:spAutoFit/>
+            </a:bodyPr>
+            <a:lstStyle/>
+            <a:p>
+              <a:pPr algn="ctr"/>
+              <a:r>
+                <a:rPr lang="en-US" sz="4000" b="1" dirty="0">
+                  <a:solidFill>
+                    <a:srgbClr val="FF0000"/>
+                  </a:solidFill>
+                </a:rPr>
+                <a:t>+</a:t>
+              </a:r>
+            </a:p>
+          </p:txBody>
+        </p:sp>
+        <p:sp>
+          <p:nvSpPr>
+            <p:cNvPr id="35" name="TextBox 34">
+              <a:extLst>
+                <a:ext uri="{FF2B5EF4-FFF2-40B4-BE49-F238E27FC236}">
+                  <a16:creationId xmlns:a16="http://schemas.microsoft.com/office/drawing/2014/main" id="{A2358390-0B07-457A-B2BC-64E7EAF56B9E}"/>
+                </a:ext>
+              </a:extLst>
+            </p:cNvPr>
+            <p:cNvSpPr txBox="1"/>
+            <p:nvPr/>
+          </p:nvSpPr>
+          <p:spPr>
+            <a:xfrm>
+              <a:off x="5662156" y="4181440"/>
+              <a:ext cx="531181" cy="707886"/>
+            </a:xfrm>
+            <a:prstGeom prst="rect">
+              <a:avLst/>
+            </a:prstGeom>
+            <a:noFill/>
+          </p:spPr>
+          <p:txBody>
+            <a:bodyPr wrap="square" rtlCol="0">
+              <a:spAutoFit/>
+            </a:bodyPr>
+            <a:lstStyle/>
+            <a:p>
+              <a:pPr algn="ctr"/>
+              <a:r>
+                <a:rPr lang="en-US" sz="4000" b="1" dirty="0">
+                  <a:solidFill>
+                    <a:srgbClr val="FF0000"/>
+                  </a:solidFill>
+                </a:rPr>
+                <a:t>+</a:t>
+              </a:r>
+            </a:p>
+          </p:txBody>
+        </p:sp>
+        <p:sp>
+          <p:nvSpPr>
+            <p:cNvPr id="36" name="TextBox 35">
+              <a:extLst>
+                <a:ext uri="{FF2B5EF4-FFF2-40B4-BE49-F238E27FC236}">
+                  <a16:creationId xmlns:a16="http://schemas.microsoft.com/office/drawing/2014/main" id="{F6DDE6C0-A07A-48F8-B66E-E789A8793505}"/>
+                </a:ext>
+              </a:extLst>
+            </p:cNvPr>
+            <p:cNvSpPr txBox="1"/>
+            <p:nvPr/>
+          </p:nvSpPr>
+          <p:spPr>
+            <a:xfrm>
+              <a:off x="5635122" y="3596214"/>
+              <a:ext cx="531181" cy="707886"/>
+            </a:xfrm>
+            <a:prstGeom prst="rect">
+              <a:avLst/>
+            </a:prstGeom>
+            <a:noFill/>
+          </p:spPr>
+          <p:txBody>
+            <a:bodyPr wrap="square" rtlCol="0">
+              <a:spAutoFit/>
+            </a:bodyPr>
+            <a:lstStyle/>
+            <a:p>
+              <a:pPr algn="ctr"/>
+              <a:r>
+                <a:rPr lang="en-US" sz="4000" b="1" dirty="0">
+                  <a:solidFill>
+                    <a:srgbClr val="FF0000"/>
+                  </a:solidFill>
+                </a:rPr>
+                <a:t>+</a:t>
+              </a:r>
+            </a:p>
+          </p:txBody>
+        </p:sp>
+      </p:grpSp>
+      <p:grpSp>
+        <p:nvGrpSpPr>
+          <p:cNvPr id="46" name="Group 45">
+            <a:extLst>
+              <a:ext uri="{FF2B5EF4-FFF2-40B4-BE49-F238E27FC236}">
+                <a16:creationId xmlns:a16="http://schemas.microsoft.com/office/drawing/2014/main" id="{04010263-ECD4-4398-AD32-88B4B60DF1F3}"/>
+              </a:ext>
+            </a:extLst>
+          </p:cNvPr>
+          <p:cNvGrpSpPr/>
+          <p:nvPr/>
+        </p:nvGrpSpPr>
+        <p:grpSpPr>
+          <a:xfrm>
+            <a:off x="3449344" y="3229993"/>
+            <a:ext cx="1376039" cy="1610092"/>
+            <a:chOff x="3449344" y="3229993"/>
+            <a:chExt cx="1376039" cy="1610092"/>
+          </a:xfrm>
+        </p:grpSpPr>
+        <p:sp>
+          <p:nvSpPr>
+            <p:cNvPr id="11" name="Oval 10">
+              <a:extLst>
+                <a:ext uri="{FF2B5EF4-FFF2-40B4-BE49-F238E27FC236}">
+                  <a16:creationId xmlns:a16="http://schemas.microsoft.com/office/drawing/2014/main" id="{E8D081A8-3F42-461D-BFA7-71B90040879C}"/>
+                </a:ext>
+              </a:extLst>
+            </p:cNvPr>
+            <p:cNvSpPr/>
+            <p:nvPr/>
+          </p:nvSpPr>
+          <p:spPr>
+            <a:xfrm>
+              <a:off x="3449344" y="3428999"/>
+              <a:ext cx="1376039" cy="1349405"/>
+            </a:xfrm>
+            <a:prstGeom prst="ellipse">
+              <a:avLst/>
+            </a:prstGeom>
+            <a:ln w="57150"/>
+          </p:spPr>
+          <p:style>
+            <a:lnRef idx="1">
+              <a:schemeClr val="accent3"/>
+            </a:lnRef>
+            <a:fillRef idx="2">
+              <a:schemeClr val="accent3"/>
+            </a:fillRef>
+            <a:effectRef idx="1">
+              <a:schemeClr val="accent3"/>
+            </a:effectRef>
+            <a:fontRef idx="minor">
+              <a:schemeClr val="dk1"/>
+            </a:fontRef>
+          </p:style>
+          <p:txBody>
+            <a:bodyPr rtlCol="0" anchor="ctr"/>
+            <a:lstStyle/>
+            <a:p>
+              <a:pPr algn="ctr"/>
+              <a:endParaRPr lang="en-US"/>
+            </a:p>
+          </p:txBody>
+        </p:sp>
+        <p:sp>
+          <p:nvSpPr>
+            <p:cNvPr id="27" name="TextBox 26">
+              <a:extLst>
+                <a:ext uri="{FF2B5EF4-FFF2-40B4-BE49-F238E27FC236}">
+                  <a16:creationId xmlns:a16="http://schemas.microsoft.com/office/drawing/2014/main" id="{1ED316DC-6B4D-4B40-A19D-5E4CDB253E9A}"/>
+                </a:ext>
+              </a:extLst>
+            </p:cNvPr>
+            <p:cNvSpPr txBox="1"/>
+            <p:nvPr/>
+          </p:nvSpPr>
+          <p:spPr>
+            <a:xfrm>
+              <a:off x="3707122" y="3272862"/>
+              <a:ext cx="531181" cy="830997"/>
+            </a:xfrm>
+            <a:prstGeom prst="rect">
+              <a:avLst/>
+            </a:prstGeom>
+            <a:noFill/>
+          </p:spPr>
+          <p:txBody>
+            <a:bodyPr wrap="square" rtlCol="0">
+              <a:spAutoFit/>
+            </a:bodyPr>
+            <a:lstStyle/>
+            <a:p>
+              <a:pPr algn="ctr"/>
+              <a:r>
+                <a:rPr lang="en-US" sz="4800" b="1" dirty="0">
+                  <a:solidFill>
+                    <a:srgbClr val="0070C0"/>
+                  </a:solidFill>
+                </a:rPr>
+                <a:t>-</a:t>
+              </a:r>
+            </a:p>
+          </p:txBody>
+        </p:sp>
+        <p:sp>
+          <p:nvSpPr>
+            <p:cNvPr id="28" name="TextBox 27">
+              <a:extLst>
+                <a:ext uri="{FF2B5EF4-FFF2-40B4-BE49-F238E27FC236}">
+                  <a16:creationId xmlns:a16="http://schemas.microsoft.com/office/drawing/2014/main" id="{A7052229-C4AE-48D0-8FE5-510D9647506D}"/>
+                </a:ext>
+              </a:extLst>
+            </p:cNvPr>
+            <p:cNvSpPr txBox="1"/>
+            <p:nvPr/>
+          </p:nvSpPr>
+          <p:spPr>
+            <a:xfrm>
+              <a:off x="4028611" y="3478649"/>
+              <a:ext cx="531181" cy="830997"/>
+            </a:xfrm>
+            <a:prstGeom prst="rect">
+              <a:avLst/>
+            </a:prstGeom>
+            <a:noFill/>
+          </p:spPr>
+          <p:txBody>
+            <a:bodyPr wrap="square" rtlCol="0">
+              <a:spAutoFit/>
+            </a:bodyPr>
+            <a:lstStyle/>
+            <a:p>
+              <a:pPr algn="ctr"/>
+              <a:r>
+                <a:rPr lang="en-US" sz="4800" b="1" dirty="0">
+                  <a:solidFill>
+                    <a:srgbClr val="0070C0"/>
+                  </a:solidFill>
+                </a:rPr>
+                <a:t>-</a:t>
+              </a:r>
+            </a:p>
+          </p:txBody>
+        </p:sp>
+        <p:sp>
+          <p:nvSpPr>
+            <p:cNvPr id="29" name="TextBox 28">
+              <a:extLst>
+                <a:ext uri="{FF2B5EF4-FFF2-40B4-BE49-F238E27FC236}">
+                  <a16:creationId xmlns:a16="http://schemas.microsoft.com/office/drawing/2014/main" id="{4370DE34-9F77-4008-A501-6855C08AACFD}"/>
+                </a:ext>
+              </a:extLst>
+            </p:cNvPr>
+            <p:cNvSpPr txBox="1"/>
+            <p:nvPr/>
+          </p:nvSpPr>
+          <p:spPr>
+            <a:xfrm>
+              <a:off x="3646688" y="3890013"/>
+              <a:ext cx="531181" cy="830997"/>
+            </a:xfrm>
+            <a:prstGeom prst="rect">
+              <a:avLst/>
+            </a:prstGeom>
+            <a:noFill/>
+          </p:spPr>
+          <p:txBody>
+            <a:bodyPr wrap="square" rtlCol="0">
+              <a:spAutoFit/>
+            </a:bodyPr>
+            <a:lstStyle/>
+            <a:p>
+              <a:pPr algn="ctr"/>
+              <a:r>
+                <a:rPr lang="en-US" sz="4800" b="1" dirty="0">
+                  <a:solidFill>
+                    <a:srgbClr val="0070C0"/>
+                  </a:solidFill>
+                </a:rPr>
+                <a:t>-</a:t>
+              </a:r>
+            </a:p>
+          </p:txBody>
+        </p:sp>
+        <p:sp>
+          <p:nvSpPr>
+            <p:cNvPr id="30" name="TextBox 29">
+              <a:extLst>
+                <a:ext uri="{FF2B5EF4-FFF2-40B4-BE49-F238E27FC236}">
+                  <a16:creationId xmlns:a16="http://schemas.microsoft.com/office/drawing/2014/main" id="{ECE69CC0-65FB-4AD4-88B1-E858AEEF89F4}"/>
+                </a:ext>
+              </a:extLst>
+            </p:cNvPr>
+            <p:cNvSpPr txBox="1"/>
+            <p:nvPr/>
+          </p:nvSpPr>
+          <p:spPr>
+            <a:xfrm>
+              <a:off x="4028610" y="4009088"/>
+              <a:ext cx="531181" cy="830997"/>
+            </a:xfrm>
+            <a:prstGeom prst="rect">
+              <a:avLst/>
+            </a:prstGeom>
+            <a:noFill/>
+          </p:spPr>
+          <p:txBody>
+            <a:bodyPr wrap="square" rtlCol="0">
+              <a:spAutoFit/>
+            </a:bodyPr>
+            <a:lstStyle/>
+            <a:p>
+              <a:pPr algn="ctr"/>
+              <a:r>
+                <a:rPr lang="en-US" sz="4800" b="1" dirty="0">
+                  <a:solidFill>
+                    <a:srgbClr val="0070C0"/>
+                  </a:solidFill>
+                </a:rPr>
+                <a:t>-</a:t>
+              </a:r>
+            </a:p>
+          </p:txBody>
+        </p:sp>
+        <p:sp>
+          <p:nvSpPr>
+            <p:cNvPr id="31" name="TextBox 30">
+              <a:extLst>
+                <a:ext uri="{FF2B5EF4-FFF2-40B4-BE49-F238E27FC236}">
+                  <a16:creationId xmlns:a16="http://schemas.microsoft.com/office/drawing/2014/main" id="{3F7B19FD-8154-475E-B099-420FC29562E6}"/>
+                </a:ext>
+              </a:extLst>
+            </p:cNvPr>
+            <p:cNvSpPr txBox="1"/>
+            <p:nvPr/>
+          </p:nvSpPr>
+          <p:spPr>
+            <a:xfrm>
+              <a:off x="4078157" y="3229993"/>
+              <a:ext cx="531181" cy="830997"/>
+            </a:xfrm>
+            <a:prstGeom prst="rect">
+              <a:avLst/>
+            </a:prstGeom>
+            <a:noFill/>
+          </p:spPr>
+          <p:txBody>
+            <a:bodyPr wrap="square" rtlCol="0">
+              <a:spAutoFit/>
+            </a:bodyPr>
+            <a:lstStyle/>
+            <a:p>
+              <a:pPr algn="ctr"/>
+              <a:r>
+                <a:rPr lang="en-US" sz="4800" b="1" dirty="0">
+                  <a:solidFill>
+                    <a:srgbClr val="0070C0"/>
+                  </a:solidFill>
+                </a:rPr>
+                <a:t>-</a:t>
+              </a:r>
+            </a:p>
+          </p:txBody>
+        </p:sp>
+        <p:sp>
+          <p:nvSpPr>
+            <p:cNvPr id="32" name="TextBox 31">
+              <a:extLst>
+                <a:ext uri="{FF2B5EF4-FFF2-40B4-BE49-F238E27FC236}">
+                  <a16:creationId xmlns:a16="http://schemas.microsoft.com/office/drawing/2014/main" id="{5EF8E5DB-639B-4481-A341-6E4512CDAEA3}"/>
+                </a:ext>
+              </a:extLst>
+            </p:cNvPr>
+            <p:cNvSpPr txBox="1"/>
+            <p:nvPr/>
+          </p:nvSpPr>
+          <p:spPr>
+            <a:xfrm>
+              <a:off x="3513055" y="3426892"/>
+              <a:ext cx="531181" cy="830997"/>
+            </a:xfrm>
+            <a:prstGeom prst="rect">
+              <a:avLst/>
+            </a:prstGeom>
+            <a:noFill/>
+          </p:spPr>
+          <p:txBody>
+            <a:bodyPr wrap="square" rtlCol="0">
+              <a:spAutoFit/>
+            </a:bodyPr>
+            <a:lstStyle/>
+            <a:p>
+              <a:pPr algn="ctr"/>
+              <a:r>
+                <a:rPr lang="en-US" sz="4800" b="1" dirty="0">
+                  <a:solidFill>
+                    <a:srgbClr val="0070C0"/>
+                  </a:solidFill>
+                </a:rPr>
+                <a:t>-</a:t>
+              </a:r>
+            </a:p>
+          </p:txBody>
+        </p:sp>
+        <p:sp>
+          <p:nvSpPr>
+            <p:cNvPr id="37" name="TextBox 36">
+              <a:extLst>
+                <a:ext uri="{FF2B5EF4-FFF2-40B4-BE49-F238E27FC236}">
+                  <a16:creationId xmlns:a16="http://schemas.microsoft.com/office/drawing/2014/main" id="{CF8DBF3C-A46E-4716-AEED-8BA81E723A5A}"/>
+                </a:ext>
+              </a:extLst>
+            </p:cNvPr>
+            <p:cNvSpPr txBox="1"/>
+            <p:nvPr/>
+          </p:nvSpPr>
+          <p:spPr>
+            <a:xfrm>
+              <a:off x="4204903" y="3791345"/>
+              <a:ext cx="531181" cy="707886"/>
+            </a:xfrm>
+            <a:prstGeom prst="rect">
+              <a:avLst/>
+            </a:prstGeom>
+            <a:noFill/>
+          </p:spPr>
+          <p:txBody>
+            <a:bodyPr wrap="square" rtlCol="0">
+              <a:spAutoFit/>
+            </a:bodyPr>
+            <a:lstStyle/>
+            <a:p>
+              <a:pPr algn="ctr"/>
+              <a:r>
+                <a:rPr lang="en-US" sz="4000" b="1" dirty="0">
+                  <a:solidFill>
+                    <a:srgbClr val="FF0000"/>
+                  </a:solidFill>
+                </a:rPr>
+                <a:t>+</a:t>
+              </a:r>
+            </a:p>
+          </p:txBody>
+        </p:sp>
+      </p:grpSp>
+      <p:grpSp>
+        <p:nvGrpSpPr>
+          <p:cNvPr id="47" name="Group 46">
+            <a:extLst>
+              <a:ext uri="{FF2B5EF4-FFF2-40B4-BE49-F238E27FC236}">
+                <a16:creationId xmlns:a16="http://schemas.microsoft.com/office/drawing/2014/main" id="{1ACEED68-5020-4788-9EE3-53C32922774D}"/>
+              </a:ext>
+            </a:extLst>
+          </p:cNvPr>
+          <p:cNvGrpSpPr/>
+          <p:nvPr/>
+        </p:nvGrpSpPr>
+        <p:grpSpPr>
+          <a:xfrm>
+            <a:off x="1628312" y="3271888"/>
+            <a:ext cx="1376039" cy="1517731"/>
+            <a:chOff x="1628312" y="3271888"/>
+            <a:chExt cx="1376039" cy="1517731"/>
+          </a:xfrm>
+        </p:grpSpPr>
+        <p:sp>
+          <p:nvSpPr>
+            <p:cNvPr id="10" name="Oval 9">
+              <a:extLst>
+                <a:ext uri="{FF2B5EF4-FFF2-40B4-BE49-F238E27FC236}">
+                  <a16:creationId xmlns:a16="http://schemas.microsoft.com/office/drawing/2014/main" id="{10C7DD83-DB5E-4722-96CE-4728862D09EC}"/>
+                </a:ext>
+              </a:extLst>
+            </p:cNvPr>
+            <p:cNvSpPr/>
+            <p:nvPr/>
+          </p:nvSpPr>
+          <p:spPr>
+            <a:xfrm>
+              <a:off x="1628312" y="3428998"/>
+              <a:ext cx="1376039" cy="1349405"/>
+            </a:xfrm>
+            <a:prstGeom prst="ellipse">
+              <a:avLst/>
+            </a:prstGeom>
+            <a:ln w="57150"/>
+          </p:spPr>
+          <p:style>
+            <a:lnRef idx="1">
+              <a:schemeClr val="accent3"/>
+            </a:lnRef>
+            <a:fillRef idx="2">
+              <a:schemeClr val="accent3"/>
+            </a:fillRef>
+            <a:effectRef idx="1">
+              <a:schemeClr val="accent3"/>
+            </a:effectRef>
+            <a:fontRef idx="minor">
+              <a:schemeClr val="dk1"/>
+            </a:fontRef>
+          </p:style>
+          <p:txBody>
+            <a:bodyPr rtlCol="0" anchor="ctr"/>
+            <a:lstStyle/>
+            <a:p>
+              <a:pPr algn="ctr"/>
+              <a:endParaRPr lang="en-US"/>
+            </a:p>
+          </p:txBody>
+        </p:sp>
+        <p:sp>
+          <p:nvSpPr>
+            <p:cNvPr id="17" name="TextBox 16">
+              <a:extLst>
+                <a:ext uri="{FF2B5EF4-FFF2-40B4-BE49-F238E27FC236}">
+                  <a16:creationId xmlns:a16="http://schemas.microsoft.com/office/drawing/2014/main" id="{0E900530-B27A-44FC-85EF-54BAD51C8784}"/>
+                </a:ext>
+              </a:extLst>
+            </p:cNvPr>
+            <p:cNvSpPr txBox="1"/>
+            <p:nvPr/>
+          </p:nvSpPr>
+          <p:spPr>
+            <a:xfrm>
+              <a:off x="2271289" y="3271888"/>
+              <a:ext cx="531181" cy="830997"/>
+            </a:xfrm>
+            <a:prstGeom prst="rect">
+              <a:avLst/>
+            </a:prstGeom>
+            <a:noFill/>
+          </p:spPr>
+          <p:txBody>
+            <a:bodyPr wrap="square" rtlCol="0">
+              <a:spAutoFit/>
+            </a:bodyPr>
+            <a:lstStyle/>
+            <a:p>
+              <a:pPr algn="ctr"/>
+              <a:r>
+                <a:rPr lang="en-US" sz="4800" b="1" dirty="0">
+                  <a:solidFill>
+                    <a:srgbClr val="0070C0"/>
+                  </a:solidFill>
+                </a:rPr>
+                <a:t>-</a:t>
+              </a:r>
+            </a:p>
+          </p:txBody>
+        </p:sp>
+        <p:sp>
+          <p:nvSpPr>
+            <p:cNvPr id="22" name="TextBox 21">
+              <a:extLst>
+                <a:ext uri="{FF2B5EF4-FFF2-40B4-BE49-F238E27FC236}">
+                  <a16:creationId xmlns:a16="http://schemas.microsoft.com/office/drawing/2014/main" id="{50FA203B-07BB-480F-B618-36EE37C1EE14}"/>
+                </a:ext>
+              </a:extLst>
+            </p:cNvPr>
+            <p:cNvSpPr txBox="1"/>
+            <p:nvPr/>
+          </p:nvSpPr>
+          <p:spPr>
+            <a:xfrm>
+              <a:off x="1783202" y="3428998"/>
+              <a:ext cx="531181" cy="830997"/>
+            </a:xfrm>
+            <a:prstGeom prst="rect">
+              <a:avLst/>
+            </a:prstGeom>
+            <a:noFill/>
+          </p:spPr>
+          <p:txBody>
+            <a:bodyPr wrap="square" rtlCol="0">
+              <a:spAutoFit/>
+            </a:bodyPr>
+            <a:lstStyle/>
+            <a:p>
+              <a:pPr algn="ctr"/>
+              <a:r>
+                <a:rPr lang="en-US" sz="4800" b="1" dirty="0">
+                  <a:solidFill>
+                    <a:srgbClr val="0070C0"/>
+                  </a:solidFill>
+                </a:rPr>
+                <a:t>-</a:t>
+              </a:r>
+            </a:p>
+          </p:txBody>
+        </p:sp>
+        <p:sp>
+          <p:nvSpPr>
+            <p:cNvPr id="24" name="TextBox 23">
+              <a:extLst>
+                <a:ext uri="{FF2B5EF4-FFF2-40B4-BE49-F238E27FC236}">
+                  <a16:creationId xmlns:a16="http://schemas.microsoft.com/office/drawing/2014/main" id="{397DF325-BF76-4ADA-973E-583E2E983BC1}"/>
+                </a:ext>
+              </a:extLst>
+            </p:cNvPr>
+            <p:cNvSpPr txBox="1"/>
+            <p:nvPr/>
+          </p:nvSpPr>
+          <p:spPr>
+            <a:xfrm>
+              <a:off x="2469273" y="3765942"/>
+              <a:ext cx="531181" cy="830997"/>
+            </a:xfrm>
+            <a:prstGeom prst="rect">
+              <a:avLst/>
+            </a:prstGeom>
+            <a:noFill/>
+          </p:spPr>
+          <p:txBody>
+            <a:bodyPr wrap="square" rtlCol="0">
+              <a:spAutoFit/>
+            </a:bodyPr>
+            <a:lstStyle/>
+            <a:p>
+              <a:pPr algn="ctr"/>
+              <a:r>
+                <a:rPr lang="en-US" sz="4800" b="1" dirty="0">
+                  <a:solidFill>
+                    <a:srgbClr val="0070C0"/>
+                  </a:solidFill>
+                </a:rPr>
+                <a:t>-</a:t>
+              </a:r>
+            </a:p>
+          </p:txBody>
+        </p:sp>
+        <p:sp>
+          <p:nvSpPr>
+            <p:cNvPr id="25" name="TextBox 24">
+              <a:extLst>
+                <a:ext uri="{FF2B5EF4-FFF2-40B4-BE49-F238E27FC236}">
+                  <a16:creationId xmlns:a16="http://schemas.microsoft.com/office/drawing/2014/main" id="{66DB73AD-54F2-4C54-BBB6-5BEE0E43F086}"/>
+                </a:ext>
+              </a:extLst>
+            </p:cNvPr>
+            <p:cNvSpPr txBox="1"/>
+            <p:nvPr/>
+          </p:nvSpPr>
+          <p:spPr>
+            <a:xfrm>
+              <a:off x="2146718" y="3958622"/>
+              <a:ext cx="531181" cy="830997"/>
+            </a:xfrm>
+            <a:prstGeom prst="rect">
+              <a:avLst/>
+            </a:prstGeom>
+            <a:noFill/>
+          </p:spPr>
+          <p:txBody>
+            <a:bodyPr wrap="square" rtlCol="0">
+              <a:spAutoFit/>
+            </a:bodyPr>
+            <a:lstStyle/>
+            <a:p>
+              <a:pPr algn="ctr"/>
+              <a:r>
+                <a:rPr lang="en-US" sz="4800" b="1" dirty="0">
+                  <a:solidFill>
+                    <a:srgbClr val="0070C0"/>
+                  </a:solidFill>
+                </a:rPr>
+                <a:t>-</a:t>
+              </a:r>
+            </a:p>
+          </p:txBody>
+        </p:sp>
+        <p:sp>
+          <p:nvSpPr>
+            <p:cNvPr id="38" name="TextBox 37">
+              <a:extLst>
+                <a:ext uri="{FF2B5EF4-FFF2-40B4-BE49-F238E27FC236}">
+                  <a16:creationId xmlns:a16="http://schemas.microsoft.com/office/drawing/2014/main" id="{4EA7824D-13DC-43AA-8CB2-DBF881F661BC}"/>
+                </a:ext>
+              </a:extLst>
+            </p:cNvPr>
+            <p:cNvSpPr txBox="1"/>
+            <p:nvPr/>
+          </p:nvSpPr>
+          <p:spPr>
+            <a:xfrm>
+              <a:off x="2128507" y="3625842"/>
+              <a:ext cx="531181" cy="707886"/>
+            </a:xfrm>
+            <a:prstGeom prst="rect">
+              <a:avLst/>
+            </a:prstGeom>
+            <a:noFill/>
+          </p:spPr>
+          <p:txBody>
+            <a:bodyPr wrap="square" rtlCol="0">
+              <a:spAutoFit/>
+            </a:bodyPr>
+            <a:lstStyle/>
+            <a:p>
+              <a:pPr algn="ctr"/>
+              <a:r>
+                <a:rPr lang="en-US" sz="4000" b="1" dirty="0">
+                  <a:solidFill>
+                    <a:srgbClr val="FF0000"/>
+                  </a:solidFill>
+                </a:rPr>
+                <a:t>+</a:t>
+              </a:r>
+            </a:p>
+          </p:txBody>
+        </p:sp>
+        <p:sp>
+          <p:nvSpPr>
+            <p:cNvPr id="39" name="TextBox 38">
+              <a:extLst>
+                <a:ext uri="{FF2B5EF4-FFF2-40B4-BE49-F238E27FC236}">
+                  <a16:creationId xmlns:a16="http://schemas.microsoft.com/office/drawing/2014/main" id="{DA9ABC68-5C23-4AB9-A1EB-2D6CADF2AD89}"/>
+                </a:ext>
+              </a:extLst>
+            </p:cNvPr>
+            <p:cNvSpPr txBox="1"/>
+            <p:nvPr/>
+          </p:nvSpPr>
+          <p:spPr>
+            <a:xfrm>
+              <a:off x="1648459" y="3699111"/>
+              <a:ext cx="531181" cy="707886"/>
+            </a:xfrm>
+            <a:prstGeom prst="rect">
+              <a:avLst/>
+            </a:prstGeom>
+            <a:noFill/>
+          </p:spPr>
+          <p:txBody>
+            <a:bodyPr wrap="square" rtlCol="0">
+              <a:spAutoFit/>
+            </a:bodyPr>
+            <a:lstStyle/>
+            <a:p>
+              <a:pPr algn="ctr"/>
+              <a:r>
+                <a:rPr lang="en-US" sz="4000" b="1" dirty="0">
+                  <a:solidFill>
+                    <a:srgbClr val="FF0000"/>
+                  </a:solidFill>
+                </a:rPr>
+                <a:t>+</a:t>
+              </a:r>
+            </a:p>
+          </p:txBody>
+        </p:sp>
+        <p:sp>
+          <p:nvSpPr>
+            <p:cNvPr id="40" name="TextBox 39">
+              <a:extLst>
+                <a:ext uri="{FF2B5EF4-FFF2-40B4-BE49-F238E27FC236}">
+                  <a16:creationId xmlns:a16="http://schemas.microsoft.com/office/drawing/2014/main" id="{3079B1C0-B6B0-4892-93BE-E72579CC4C29}"/>
+                </a:ext>
+              </a:extLst>
+            </p:cNvPr>
+            <p:cNvSpPr txBox="1"/>
+            <p:nvPr/>
+          </p:nvSpPr>
+          <p:spPr>
+            <a:xfrm>
+              <a:off x="1923155" y="4065085"/>
+              <a:ext cx="531181" cy="707886"/>
+            </a:xfrm>
+            <a:prstGeom prst="rect">
+              <a:avLst/>
+            </a:prstGeom>
+            <a:noFill/>
+          </p:spPr>
+          <p:txBody>
+            <a:bodyPr wrap="square" rtlCol="0">
+              <a:spAutoFit/>
+            </a:bodyPr>
+            <a:lstStyle/>
+            <a:p>
+              <a:pPr algn="ctr"/>
+              <a:r>
+                <a:rPr lang="en-US" sz="4000" b="1" dirty="0">
+                  <a:solidFill>
+                    <a:srgbClr val="FF0000"/>
+                  </a:solidFill>
+                </a:rPr>
+                <a:t>+</a:t>
+              </a:r>
+            </a:p>
+          </p:txBody>
+        </p:sp>
+        <p:sp>
+          <p:nvSpPr>
+            <p:cNvPr id="41" name="TextBox 40">
+              <a:extLst>
+                <a:ext uri="{FF2B5EF4-FFF2-40B4-BE49-F238E27FC236}">
+                  <a16:creationId xmlns:a16="http://schemas.microsoft.com/office/drawing/2014/main" id="{42812E0E-7107-47CC-841A-D16D8014BE2A}"/>
+                </a:ext>
+              </a:extLst>
+            </p:cNvPr>
+            <p:cNvSpPr txBox="1"/>
+            <p:nvPr/>
+          </p:nvSpPr>
+          <p:spPr>
+            <a:xfrm>
+              <a:off x="1969223" y="3283466"/>
+              <a:ext cx="531181" cy="707886"/>
+            </a:xfrm>
+            <a:prstGeom prst="rect">
+              <a:avLst/>
+            </a:prstGeom>
+            <a:noFill/>
+          </p:spPr>
+          <p:txBody>
+            <a:bodyPr wrap="square" rtlCol="0">
+              <a:spAutoFit/>
+            </a:bodyPr>
+            <a:lstStyle/>
+            <a:p>
+              <a:pPr algn="ctr"/>
+              <a:r>
+                <a:rPr lang="en-US" sz="4000" b="1" dirty="0">
+                  <a:solidFill>
+                    <a:srgbClr val="FF0000"/>
+                  </a:solidFill>
+                </a:rPr>
+                <a:t>+</a:t>
+              </a:r>
+            </a:p>
+          </p:txBody>
+        </p:sp>
+      </p:grpSp>
+      <p:sp>
+        <p:nvSpPr>
+          <p:cNvPr id="42" name="TextBox 41">
+            <a:extLst>
+              <a:ext uri="{FF2B5EF4-FFF2-40B4-BE49-F238E27FC236}">
+                <a16:creationId xmlns:a16="http://schemas.microsoft.com/office/drawing/2014/main" id="{B403A441-1EF2-4F24-B186-53B0621279BF}"/>
+              </a:ext>
+            </a:extLst>
+          </p:cNvPr>
+          <p:cNvSpPr txBox="1"/>
+          <p:nvPr/>
+        </p:nvSpPr>
+        <p:spPr>
+          <a:xfrm>
+            <a:off x="10661135" y="5050231"/>
+            <a:ext cx="531181" cy="707886"/>
+          </a:xfrm>
+          <a:prstGeom prst="rect">
+            <a:avLst/>
+          </a:prstGeom>
+          <a:noFill/>
+        </p:spPr>
+        <p:txBody>
+          <a:bodyPr wrap="square" rtlCol="0">
+            <a:spAutoFit/>
+          </a:bodyPr>
+          <a:lstStyle/>
+          <a:p>
+            <a:pPr algn="ctr"/>
+            <a:r>
+              <a:rPr lang="en-US" sz="4000" b="1" dirty="0">
+                <a:solidFill>
+                  <a:srgbClr val="FF0000"/>
+                </a:solidFill>
+              </a:rPr>
+              <a:t>+</a:t>
+            </a:r>
+          </a:p>
+        </p:txBody>
+      </p:sp>
+      <p:sp>
+        <p:nvSpPr>
+          <p:cNvPr id="48" name="TextBox 47">
+            <a:extLst>
+              <a:ext uri="{FF2B5EF4-FFF2-40B4-BE49-F238E27FC236}">
+                <a16:creationId xmlns:a16="http://schemas.microsoft.com/office/drawing/2014/main" id="{B1E585B3-D330-447E-9950-D4B70896AD45}"/>
+              </a:ext>
+            </a:extLst>
+          </p:cNvPr>
+          <p:cNvSpPr txBox="1"/>
+          <p:nvPr/>
+        </p:nvSpPr>
+        <p:spPr>
+          <a:xfrm>
+            <a:off x="7222257" y="3810306"/>
+            <a:ext cx="3186541" cy="584775"/>
+          </a:xfrm>
+          <a:prstGeom prst="rect">
+            <a:avLst/>
+          </a:prstGeom>
+          <a:noFill/>
+          <a:ln w="57150">
+            <a:solidFill>
+              <a:schemeClr val="bg1">
+                <a:lumMod val="65000"/>
+              </a:schemeClr>
+            </a:solidFill>
+          </a:ln>
+        </p:spPr>
+        <p:txBody>
+          <a:bodyPr wrap="square" rtlCol="0">
+            <a:spAutoFit/>
+          </a:bodyPr>
+          <a:lstStyle/>
+          <a:p>
+            <a:pPr algn="ctr"/>
+            <a:r>
+              <a:rPr lang="en-US" sz="3200" b="1" dirty="0">
+                <a:solidFill>
+                  <a:srgbClr val="FF0000"/>
+                </a:solidFill>
+              </a:rPr>
+              <a:t>Positive Bags</a:t>
+            </a:r>
+          </a:p>
+        </p:txBody>
+      </p:sp>
+      <p:sp>
+        <p:nvSpPr>
+          <p:cNvPr id="49" name="TextBox 48">
+            <a:extLst>
+              <a:ext uri="{FF2B5EF4-FFF2-40B4-BE49-F238E27FC236}">
+                <a16:creationId xmlns:a16="http://schemas.microsoft.com/office/drawing/2014/main" id="{55C4F553-31E2-458B-84F9-FB3807DE5FA2}"/>
+              </a:ext>
+            </a:extLst>
+          </p:cNvPr>
+          <p:cNvSpPr txBox="1"/>
+          <p:nvPr/>
+        </p:nvSpPr>
+        <p:spPr>
+          <a:xfrm>
+            <a:off x="7222257" y="2119953"/>
+            <a:ext cx="3186541" cy="584775"/>
+          </a:xfrm>
+          <a:prstGeom prst="rect">
+            <a:avLst/>
+          </a:prstGeom>
+          <a:noFill/>
+          <a:ln w="57150">
+            <a:solidFill>
+              <a:schemeClr val="bg1">
+                <a:lumMod val="65000"/>
+              </a:schemeClr>
+            </a:solidFill>
+          </a:ln>
+        </p:spPr>
+        <p:txBody>
+          <a:bodyPr wrap="square" rtlCol="0">
+            <a:spAutoFit/>
+          </a:bodyPr>
+          <a:lstStyle/>
+          <a:p>
+            <a:pPr algn="ctr"/>
+            <a:r>
+              <a:rPr lang="en-US" sz="3200" b="1" dirty="0">
+                <a:solidFill>
+                  <a:srgbClr val="0070C0"/>
+                </a:solidFill>
+              </a:rPr>
+              <a:t>Negative Bags</a:t>
+            </a:r>
+          </a:p>
+        </p:txBody>
+      </p:sp>
+    </p:spTree>
+    <p:extLst>
+      <p:ext uri="{BB962C8B-B14F-4D97-AF65-F5344CB8AC3E}">
+        <p14:creationId xmlns:p14="http://schemas.microsoft.com/office/powerpoint/2010/main" val="3843257664"/>
+      </p:ext>
+    </p:extLst>
+  </p:cSld>
+  <p:clrMapOvr>
+    <a:masterClrMapping/>
+  </p:clrMapOvr>
+</p:sld>
+</file>
+
 <file path=ppt/theme/theme1.xml><?xml version="1.0" encoding="utf-8"?>
 <a:theme xmlns:a="http://schemas.openxmlformats.org/drawingml/2006/main" name="Office Theme">
   <a:themeElements>

</xml_diff>